<commit_message>
Added my two cents
</commit_message>
<xml_diff>
--- a/presentation/presentation.pptx
+++ b/presentation/presentation.pptx
@@ -5,18 +5,17 @@
     <p:sldMasterId id="2147483648" r:id="rId4"/>
   </p:sldMasterIdLst>
   <p:notesMasterIdLst>
-    <p:notesMasterId r:id="rId11"/>
+    <p:notesMasterId r:id="rId10"/>
   </p:notesMasterIdLst>
   <p:handoutMasterIdLst>
-    <p:handoutMasterId r:id="rId12"/>
+    <p:handoutMasterId r:id="rId11"/>
   </p:handoutMasterIdLst>
   <p:sldIdLst>
     <p:sldId id="347" r:id="rId5"/>
-    <p:sldId id="348" r:id="rId6"/>
-    <p:sldId id="349" r:id="rId7"/>
+    <p:sldId id="349" r:id="rId6"/>
+    <p:sldId id="352" r:id="rId7"/>
     <p:sldId id="350" r:id="rId8"/>
     <p:sldId id="351" r:id="rId9"/>
-    <p:sldId id="352" r:id="rId10"/>
   </p:sldIdLst>
   <p:sldSz cx="9144000" cy="6858000" type="screen4x3"/>
   <p:notesSz cx="7010400" cy="9296400"/>
@@ -375,7 +374,7 @@
               <a:pPr>
                 <a:defRPr/>
               </a:pPr>
-              <a:t>7/22/16</a:t>
+              <a:t>7/27/16</a:t>
             </a:fld>
             <a:endParaRPr lang="en-US" dirty="0"/>
           </a:p>
@@ -591,7 +590,7 @@
               <a:pPr>
                 <a:defRPr/>
               </a:pPr>
-              <a:t>7/22/16</a:t>
+              <a:t>7/27/16</a:t>
             </a:fld>
             <a:endParaRPr lang="en-US" dirty="0"/>
           </a:p>
@@ -1052,30 +1051,11 @@
           <a:bodyPr/>
           <a:lstStyle/>
           <a:p>
-            <a:pPr marL="0" marR="0" indent="0" algn="l" defTabSz="457200" rtl="0" eaLnBrk="1" fontAlgn="base" latinLnBrk="0" hangingPunct="1">
-              <a:lnSpc>
-                <a:spcPct val="100000"/>
-              </a:lnSpc>
-              <a:spcBef>
-                <a:spcPct val="30000"/>
-              </a:spcBef>
-              <a:spcAft>
-                <a:spcPct val="0"/>
-              </a:spcAft>
-              <a:buClrTx/>
-              <a:buSzTx/>
-              <a:buFontTx/>
-              <a:buNone/>
-              <a:tabLst/>
-              <a:defRPr/>
-            </a:pPr>
             <a:r>
               <a:rPr lang="en-US" i="1" dirty="0" smtClean="0"/>
-              <a:t>Please include customer team member(s) if applicable</a:t>
-            </a:r>
-          </a:p>
-          <a:p>
-            <a:endParaRPr lang="en-US" dirty="0"/>
+              <a:t>Explain your project.</a:t>
+            </a:r>
+            <a:endParaRPr lang="en-US" i="1" dirty="0"/>
           </a:p>
         </p:txBody>
       </p:sp>
@@ -1111,7 +1091,7 @@
     </p:spTree>
     <p:extLst>
       <p:ext uri="{BB962C8B-B14F-4D97-AF65-F5344CB8AC3E}">
-        <p14:creationId xmlns:p14="http://schemas.microsoft.com/office/powerpoint/2010/main" val="2030720314"/>
+        <p14:creationId xmlns:p14="http://schemas.microsoft.com/office/powerpoint/2010/main" val="1571336657"/>
       </p:ext>
     </p:extLst>
   </p:cSld>
@@ -1205,7 +1185,7 @@
     </p:spTree>
     <p:extLst>
       <p:ext uri="{BB962C8B-B14F-4D97-AF65-F5344CB8AC3E}">
-        <p14:creationId xmlns:p14="http://schemas.microsoft.com/office/powerpoint/2010/main" val="1571336657"/>
+        <p14:creationId xmlns:p14="http://schemas.microsoft.com/office/powerpoint/2010/main" val="2135137121"/>
       </p:ext>
     </p:extLst>
   </p:cSld>
@@ -1398,104 +1378,6 @@
     <p:extLst>
       <p:ext uri="{BB962C8B-B14F-4D97-AF65-F5344CB8AC3E}">
         <p14:creationId xmlns:p14="http://schemas.microsoft.com/office/powerpoint/2010/main" val="271945090"/>
-      </p:ext>
-    </p:extLst>
-  </p:cSld>
-  <p:clrMapOvr>
-    <a:masterClrMapping/>
-  </p:clrMapOvr>
-</p:notes>
-</file>
-
-<file path=ppt/notesSlides/notesSlide6.xml><?xml version="1.0" encoding="utf-8"?>
-<p:notes xmlns:a="http://schemas.openxmlformats.org/drawingml/2006/main" xmlns:r="http://schemas.openxmlformats.org/officeDocument/2006/relationships" xmlns:p="http://schemas.openxmlformats.org/presentationml/2006/main">
-  <p:cSld>
-    <p:spTree>
-      <p:nvGrpSpPr>
-        <p:cNvPr id="1" name=""/>
-        <p:cNvGrpSpPr/>
-        <p:nvPr/>
-      </p:nvGrpSpPr>
-      <p:grpSpPr>
-        <a:xfrm>
-          <a:off x="0" y="0"/>
-          <a:ext cx="0" cy="0"/>
-          <a:chOff x="0" y="0"/>
-          <a:chExt cx="0" cy="0"/>
-        </a:xfrm>
-      </p:grpSpPr>
-      <p:sp>
-        <p:nvSpPr>
-          <p:cNvPr id="2" name="Slide Image Placeholder 1"/>
-          <p:cNvSpPr>
-            <a:spLocks noGrp="1" noRot="1" noChangeAspect="1"/>
-          </p:cNvSpPr>
-          <p:nvPr>
-            <p:ph type="sldImg"/>
-          </p:nvPr>
-        </p:nvSpPr>
-        <p:spPr/>
-      </p:sp>
-      <p:sp>
-        <p:nvSpPr>
-          <p:cNvPr id="3" name="Notes Placeholder 2"/>
-          <p:cNvSpPr>
-            <a:spLocks noGrp="1"/>
-          </p:cNvSpPr>
-          <p:nvPr>
-            <p:ph type="body" idx="1"/>
-          </p:nvPr>
-        </p:nvSpPr>
-        <p:spPr/>
-        <p:txBody>
-          <a:bodyPr/>
-          <a:lstStyle/>
-          <a:p>
-            <a:r>
-              <a:rPr lang="en-US" i="1" dirty="0" smtClean="0"/>
-              <a:t>How can the RDO Senior Leadership</a:t>
-            </a:r>
-            <a:r>
-              <a:rPr lang="en-US" i="1" baseline="0" dirty="0" smtClean="0"/>
-              <a:t> Team help support the continuation of your project?</a:t>
-            </a:r>
-            <a:endParaRPr lang="en-US" i="1" dirty="0"/>
-          </a:p>
-        </p:txBody>
-      </p:sp>
-      <p:sp>
-        <p:nvSpPr>
-          <p:cNvPr id="4" name="Slide Number Placeholder 3"/>
-          <p:cNvSpPr>
-            <a:spLocks noGrp="1"/>
-          </p:cNvSpPr>
-          <p:nvPr>
-            <p:ph type="sldNum" sz="quarter" idx="10"/>
-          </p:nvPr>
-        </p:nvSpPr>
-        <p:spPr/>
-        <p:txBody>
-          <a:bodyPr/>
-          <a:lstStyle/>
-          <a:p>
-            <a:pPr>
-              <a:defRPr/>
-            </a:pPr>
-            <a:fld id="{CED7D565-6AE2-4C22-87E6-93E63E65C640}" type="slidenum">
-              <a:rPr lang="en-US" smtClean="0"/>
-              <a:pPr>
-                <a:defRPr/>
-              </a:pPr>
-              <a:t>6</a:t>
-            </a:fld>
-            <a:endParaRPr lang="en-US" dirty="0"/>
-          </a:p>
-        </p:txBody>
-      </p:sp>
-    </p:spTree>
-    <p:extLst>
-      <p:ext uri="{BB962C8B-B14F-4D97-AF65-F5344CB8AC3E}">
-        <p14:creationId xmlns:p14="http://schemas.microsoft.com/office/powerpoint/2010/main" val="4127955643"/>
       </p:ext>
     </p:extLst>
   </p:cSld>
@@ -1667,7 +1549,7 @@
         <p:fade/>
       </p:transition>
     </mc:Choice>
-    <mc:Fallback xmlns="" xmlns:mv="urn:schemas-microsoft-com:mac:vml">
+    <mc:Fallback xmlns:mv="urn:schemas-microsoft-com:mac:vml" xmlns="">
       <p:transition spd="med">
         <p:fade/>
       </p:transition>
@@ -1851,7 +1733,7 @@
         <p:fade/>
       </p:transition>
     </mc:Choice>
-    <mc:Fallback xmlns="" xmlns:mv="urn:schemas-microsoft-com:mac:vml">
+    <mc:Fallback xmlns:mv="urn:schemas-microsoft-com:mac:vml" xmlns="">
       <p:transition spd="med">
         <p:fade/>
       </p:transition>
@@ -2108,7 +1990,7 @@
         <p:fade/>
       </p:transition>
     </mc:Choice>
-    <mc:Fallback xmlns="" xmlns:mv="urn:schemas-microsoft-com:mac:vml">
+    <mc:Fallback xmlns:mv="urn:schemas-microsoft-com:mac:vml" xmlns="">
       <p:transition spd="med">
         <p:fade/>
       </p:transition>
@@ -3262,7 +3144,7 @@
         <p:fade/>
       </p:transition>
     </mc:Choice>
-    <mc:Fallback xmlns="" xmlns:mv="urn:schemas-microsoft-com:mac:vml">
+    <mc:Fallback xmlns:mv="urn:schemas-microsoft-com:mac:vml" xmlns="">
       <p:transition spd="med">
         <p:fade/>
       </p:transition>
@@ -3816,6 +3698,435 @@
           </a:prstGeom>
         </p:spPr>
       </p:pic>
+      <p:sp>
+        <p:nvSpPr>
+          <p:cNvPr id="6" name="Subtitle 4"/>
+          <p:cNvSpPr txBox="1">
+            <a:spLocks/>
+          </p:cNvSpPr>
+          <p:nvPr/>
+        </p:nvSpPr>
+        <p:spPr bwMode="auto">
+          <a:xfrm>
+            <a:off x="365760" y="3918086"/>
+            <a:ext cx="2653013" cy="2094407"/>
+          </a:xfrm>
+          <a:prstGeom prst="rect">
+            <a:avLst/>
+          </a:prstGeom>
+          <a:noFill/>
+          <a:ln w="9525">
+            <a:noFill/>
+            <a:miter lim="800000"/>
+            <a:headEnd/>
+            <a:tailEnd/>
+          </a:ln>
+        </p:spPr>
+        <p:txBody>
+          <a:bodyPr vert="horz" wrap="square" lIns="0" tIns="0" rIns="0" bIns="0" numCol="1" anchor="t" anchorCtr="0" compatLnSpc="1">
+            <a:prstTxWarp prst="textNoShape">
+              <a:avLst/>
+            </a:prstTxWarp>
+          </a:bodyPr>
+          <a:lstStyle>
+            <a:lvl1pPr marL="182563" indent="-182563" algn="l" defTabSz="457200" rtl="0" fontAlgn="base">
+              <a:spcBef>
+                <a:spcPts val="1800"/>
+              </a:spcBef>
+              <a:spcAft>
+                <a:spcPct val="0"/>
+              </a:spcAft>
+              <a:buFontTx/>
+              <a:buNone/>
+              <a:defRPr lang="en-US" sz="2800" b="0" i="0" kern="1200" cap="none" baseline="0">
+                <a:solidFill>
+                  <a:schemeClr val="bg1"/>
+                </a:solidFill>
+                <a:effectLst/>
+                <a:latin typeface="Arial Narrow" panose="020B0606020202030204" pitchFamily="34" charset="0"/>
+                <a:ea typeface="+mn-ea"/>
+                <a:cs typeface="Arial Narrow" panose="020B0606020202030204" pitchFamily="34" charset="0"/>
+              </a:defRPr>
+            </a:lvl1pPr>
+            <a:lvl2pPr marL="419100" indent="-219075" algn="l" defTabSz="457200" rtl="0" fontAlgn="base">
+              <a:spcBef>
+                <a:spcPts val="100"/>
+              </a:spcBef>
+              <a:spcAft>
+                <a:spcPct val="0"/>
+              </a:spcAft>
+              <a:buFont typeface="Arial"/>
+              <a:buChar char="•"/>
+              <a:defRPr sz="1800" kern="1200">
+                <a:solidFill>
+                  <a:srgbClr val="6B6F71"/>
+                </a:solidFill>
+                <a:latin typeface="Helvetica"/>
+                <a:ea typeface="+mn-ea"/>
+                <a:cs typeface="Helvetica"/>
+              </a:defRPr>
+            </a:lvl2pPr>
+            <a:lvl3pPr marL="630238" indent="-182563" algn="l" defTabSz="457200" rtl="0" fontAlgn="base">
+              <a:spcBef>
+                <a:spcPct val="20000"/>
+              </a:spcBef>
+              <a:spcAft>
+                <a:spcPct val="0"/>
+              </a:spcAft>
+              <a:buFont typeface="Arial"/>
+              <a:buChar char="•"/>
+              <a:defRPr sz="1800" kern="1200">
+                <a:solidFill>
+                  <a:srgbClr val="6B6F71"/>
+                </a:solidFill>
+                <a:latin typeface="Helvetica"/>
+                <a:ea typeface="+mn-ea"/>
+                <a:cs typeface="Helvetica"/>
+              </a:defRPr>
+            </a:lvl3pPr>
+            <a:lvl4pPr marL="868363" indent="-219075" algn="l" defTabSz="457200" rtl="0" fontAlgn="base">
+              <a:spcBef>
+                <a:spcPct val="20000"/>
+              </a:spcBef>
+              <a:spcAft>
+                <a:spcPct val="0"/>
+              </a:spcAft>
+              <a:buSzPct val="100000"/>
+              <a:buFont typeface="Arial"/>
+              <a:buChar char="•"/>
+              <a:defRPr sz="1800" kern="1200">
+                <a:solidFill>
+                  <a:srgbClr val="6B6F71"/>
+                </a:solidFill>
+                <a:latin typeface="Helvetica"/>
+                <a:ea typeface="+mn-ea"/>
+                <a:cs typeface="Helvetica"/>
+              </a:defRPr>
+            </a:lvl4pPr>
+            <a:lvl5pPr marL="1060450" indent="-182563" algn="l" defTabSz="457200" rtl="0" fontAlgn="base">
+              <a:spcBef>
+                <a:spcPct val="20000"/>
+              </a:spcBef>
+              <a:spcAft>
+                <a:spcPct val="0"/>
+              </a:spcAft>
+              <a:buFont typeface="Arial"/>
+              <a:buChar char="•"/>
+              <a:defRPr sz="1800" kern="1200">
+                <a:solidFill>
+                  <a:srgbClr val="6B6F71"/>
+                </a:solidFill>
+                <a:latin typeface="Helvetica"/>
+                <a:ea typeface="+mn-ea"/>
+                <a:cs typeface="Helvetica"/>
+              </a:defRPr>
+            </a:lvl5pPr>
+            <a:lvl6pPr marL="2514600" indent="-228600" algn="l" defTabSz="457200" rtl="0" eaLnBrk="1" latinLnBrk="0" hangingPunct="1">
+              <a:spcBef>
+                <a:spcPct val="20000"/>
+              </a:spcBef>
+              <a:buFont typeface="Arial"/>
+              <a:buChar char="•"/>
+              <a:defRPr sz="2000" kern="1200">
+                <a:solidFill>
+                  <a:schemeClr val="tx1"/>
+                </a:solidFill>
+                <a:latin typeface="+mn-lt"/>
+                <a:ea typeface="+mn-ea"/>
+                <a:cs typeface="+mn-cs"/>
+              </a:defRPr>
+            </a:lvl6pPr>
+            <a:lvl7pPr marL="2971800" indent="-228600" algn="l" defTabSz="457200" rtl="0" eaLnBrk="1" latinLnBrk="0" hangingPunct="1">
+              <a:spcBef>
+                <a:spcPct val="20000"/>
+              </a:spcBef>
+              <a:buFont typeface="Arial"/>
+              <a:buChar char="•"/>
+              <a:defRPr sz="2000" kern="1200">
+                <a:solidFill>
+                  <a:schemeClr val="tx1"/>
+                </a:solidFill>
+                <a:latin typeface="+mn-lt"/>
+                <a:ea typeface="+mn-ea"/>
+                <a:cs typeface="+mn-cs"/>
+              </a:defRPr>
+            </a:lvl7pPr>
+            <a:lvl8pPr marL="3429000" indent="-228600" algn="l" defTabSz="457200" rtl="0" eaLnBrk="1" latinLnBrk="0" hangingPunct="1">
+              <a:spcBef>
+                <a:spcPct val="20000"/>
+              </a:spcBef>
+              <a:buFont typeface="Arial"/>
+              <a:buChar char="•"/>
+              <a:defRPr sz="2000" kern="1200">
+                <a:solidFill>
+                  <a:schemeClr val="tx1"/>
+                </a:solidFill>
+                <a:latin typeface="+mn-lt"/>
+                <a:ea typeface="+mn-ea"/>
+                <a:cs typeface="+mn-cs"/>
+              </a:defRPr>
+            </a:lvl8pPr>
+            <a:lvl9pPr marL="3886200" indent="-228600" algn="l" defTabSz="457200" rtl="0" eaLnBrk="1" latinLnBrk="0" hangingPunct="1">
+              <a:spcBef>
+                <a:spcPct val="20000"/>
+              </a:spcBef>
+              <a:buFont typeface="Arial"/>
+              <a:buChar char="•"/>
+              <a:defRPr sz="2000" kern="1200">
+                <a:solidFill>
+                  <a:schemeClr val="tx1"/>
+                </a:solidFill>
+                <a:latin typeface="+mn-lt"/>
+                <a:ea typeface="+mn-ea"/>
+                <a:cs typeface="+mn-cs"/>
+              </a:defRPr>
+            </a:lvl9pPr>
+          </a:lstStyle>
+          <a:p>
+            <a:pPr marL="0">
+              <a:spcBef>
+                <a:spcPts val="0"/>
+              </a:spcBef>
+            </a:pPr>
+            <a:r>
+              <a:rPr lang="en-US" dirty="0" smtClean="0"/>
+              <a:t>Brandon Hare</a:t>
+            </a:r>
+          </a:p>
+          <a:p>
+            <a:pPr marL="0">
+              <a:spcBef>
+                <a:spcPts val="0"/>
+              </a:spcBef>
+            </a:pPr>
+            <a:r>
+              <a:rPr lang="en-US" dirty="0" smtClean="0"/>
+              <a:t>Chris Rodgers</a:t>
+            </a:r>
+          </a:p>
+          <a:p>
+            <a:pPr marL="0">
+              <a:spcBef>
+                <a:spcPts val="0"/>
+              </a:spcBef>
+            </a:pPr>
+            <a:r>
+              <a:rPr lang="en-US" dirty="0" smtClean="0"/>
+              <a:t>Steve Brush</a:t>
+            </a:r>
+            <a:endParaRPr lang="en-US" dirty="0"/>
+          </a:p>
+        </p:txBody>
+      </p:sp>
+      <p:sp>
+        <p:nvSpPr>
+          <p:cNvPr id="7" name="Subtitle 4"/>
+          <p:cNvSpPr txBox="1">
+            <a:spLocks/>
+          </p:cNvSpPr>
+          <p:nvPr/>
+        </p:nvSpPr>
+        <p:spPr bwMode="auto">
+          <a:xfrm>
+            <a:off x="3448244" y="3918085"/>
+            <a:ext cx="4781356" cy="2094407"/>
+          </a:xfrm>
+          <a:prstGeom prst="rect">
+            <a:avLst/>
+          </a:prstGeom>
+          <a:noFill/>
+          <a:ln w="9525">
+            <a:noFill/>
+            <a:miter lim="800000"/>
+            <a:headEnd/>
+            <a:tailEnd/>
+          </a:ln>
+        </p:spPr>
+        <p:txBody>
+          <a:bodyPr vert="horz" wrap="square" lIns="0" tIns="0" rIns="0" bIns="0" numCol="1" anchor="t" anchorCtr="0" compatLnSpc="1">
+            <a:prstTxWarp prst="textNoShape">
+              <a:avLst/>
+            </a:prstTxWarp>
+          </a:bodyPr>
+          <a:lstStyle>
+            <a:lvl1pPr marL="182563" indent="-182563" algn="l" defTabSz="457200" rtl="0" fontAlgn="base">
+              <a:spcBef>
+                <a:spcPts val="1800"/>
+              </a:spcBef>
+              <a:spcAft>
+                <a:spcPct val="0"/>
+              </a:spcAft>
+              <a:buFontTx/>
+              <a:buNone/>
+              <a:defRPr lang="en-US" sz="2800" b="0" i="0" kern="1200" cap="none" baseline="0">
+                <a:solidFill>
+                  <a:schemeClr val="bg1"/>
+                </a:solidFill>
+                <a:effectLst/>
+                <a:latin typeface="Arial Narrow" panose="020B0606020202030204" pitchFamily="34" charset="0"/>
+                <a:ea typeface="+mn-ea"/>
+                <a:cs typeface="Arial Narrow" panose="020B0606020202030204" pitchFamily="34" charset="0"/>
+              </a:defRPr>
+            </a:lvl1pPr>
+            <a:lvl2pPr marL="419100" indent="-219075" algn="l" defTabSz="457200" rtl="0" fontAlgn="base">
+              <a:spcBef>
+                <a:spcPts val="100"/>
+              </a:spcBef>
+              <a:spcAft>
+                <a:spcPct val="0"/>
+              </a:spcAft>
+              <a:buFont typeface="Arial"/>
+              <a:buChar char="•"/>
+              <a:defRPr sz="1800" kern="1200">
+                <a:solidFill>
+                  <a:srgbClr val="6B6F71"/>
+                </a:solidFill>
+                <a:latin typeface="Helvetica"/>
+                <a:ea typeface="+mn-ea"/>
+                <a:cs typeface="Helvetica"/>
+              </a:defRPr>
+            </a:lvl2pPr>
+            <a:lvl3pPr marL="630238" indent="-182563" algn="l" defTabSz="457200" rtl="0" fontAlgn="base">
+              <a:spcBef>
+                <a:spcPct val="20000"/>
+              </a:spcBef>
+              <a:spcAft>
+                <a:spcPct val="0"/>
+              </a:spcAft>
+              <a:buFont typeface="Arial"/>
+              <a:buChar char="•"/>
+              <a:defRPr sz="1800" kern="1200">
+                <a:solidFill>
+                  <a:srgbClr val="6B6F71"/>
+                </a:solidFill>
+                <a:latin typeface="Helvetica"/>
+                <a:ea typeface="+mn-ea"/>
+                <a:cs typeface="Helvetica"/>
+              </a:defRPr>
+            </a:lvl3pPr>
+            <a:lvl4pPr marL="868363" indent="-219075" algn="l" defTabSz="457200" rtl="0" fontAlgn="base">
+              <a:spcBef>
+                <a:spcPct val="20000"/>
+              </a:spcBef>
+              <a:spcAft>
+                <a:spcPct val="0"/>
+              </a:spcAft>
+              <a:buSzPct val="100000"/>
+              <a:buFont typeface="Arial"/>
+              <a:buChar char="•"/>
+              <a:defRPr sz="1800" kern="1200">
+                <a:solidFill>
+                  <a:srgbClr val="6B6F71"/>
+                </a:solidFill>
+                <a:latin typeface="Helvetica"/>
+                <a:ea typeface="+mn-ea"/>
+                <a:cs typeface="Helvetica"/>
+              </a:defRPr>
+            </a:lvl4pPr>
+            <a:lvl5pPr marL="1060450" indent="-182563" algn="l" defTabSz="457200" rtl="0" fontAlgn="base">
+              <a:spcBef>
+                <a:spcPct val="20000"/>
+              </a:spcBef>
+              <a:spcAft>
+                <a:spcPct val="0"/>
+              </a:spcAft>
+              <a:buFont typeface="Arial"/>
+              <a:buChar char="•"/>
+              <a:defRPr sz="1800" kern="1200">
+                <a:solidFill>
+                  <a:srgbClr val="6B6F71"/>
+                </a:solidFill>
+                <a:latin typeface="Helvetica"/>
+                <a:ea typeface="+mn-ea"/>
+                <a:cs typeface="Helvetica"/>
+              </a:defRPr>
+            </a:lvl5pPr>
+            <a:lvl6pPr marL="2514600" indent="-228600" algn="l" defTabSz="457200" rtl="0" eaLnBrk="1" latinLnBrk="0" hangingPunct="1">
+              <a:spcBef>
+                <a:spcPct val="20000"/>
+              </a:spcBef>
+              <a:buFont typeface="Arial"/>
+              <a:buChar char="•"/>
+              <a:defRPr sz="2000" kern="1200">
+                <a:solidFill>
+                  <a:schemeClr val="tx1"/>
+                </a:solidFill>
+                <a:latin typeface="+mn-lt"/>
+                <a:ea typeface="+mn-ea"/>
+                <a:cs typeface="+mn-cs"/>
+              </a:defRPr>
+            </a:lvl6pPr>
+            <a:lvl7pPr marL="2971800" indent="-228600" algn="l" defTabSz="457200" rtl="0" eaLnBrk="1" latinLnBrk="0" hangingPunct="1">
+              <a:spcBef>
+                <a:spcPct val="20000"/>
+              </a:spcBef>
+              <a:buFont typeface="Arial"/>
+              <a:buChar char="•"/>
+              <a:defRPr sz="2000" kern="1200">
+                <a:solidFill>
+                  <a:schemeClr val="tx1"/>
+                </a:solidFill>
+                <a:latin typeface="+mn-lt"/>
+                <a:ea typeface="+mn-ea"/>
+                <a:cs typeface="+mn-cs"/>
+              </a:defRPr>
+            </a:lvl7pPr>
+            <a:lvl8pPr marL="3429000" indent="-228600" algn="l" defTabSz="457200" rtl="0" eaLnBrk="1" latinLnBrk="0" hangingPunct="1">
+              <a:spcBef>
+                <a:spcPct val="20000"/>
+              </a:spcBef>
+              <a:buFont typeface="Arial"/>
+              <a:buChar char="•"/>
+              <a:defRPr sz="2000" kern="1200">
+                <a:solidFill>
+                  <a:schemeClr val="tx1"/>
+                </a:solidFill>
+                <a:latin typeface="+mn-lt"/>
+                <a:ea typeface="+mn-ea"/>
+                <a:cs typeface="+mn-cs"/>
+              </a:defRPr>
+            </a:lvl8pPr>
+            <a:lvl9pPr marL="3886200" indent="-228600" algn="l" defTabSz="457200" rtl="0" eaLnBrk="1" latinLnBrk="0" hangingPunct="1">
+              <a:spcBef>
+                <a:spcPct val="20000"/>
+              </a:spcBef>
+              <a:buFont typeface="Arial"/>
+              <a:buChar char="•"/>
+              <a:defRPr sz="2000" kern="1200">
+                <a:solidFill>
+                  <a:schemeClr val="tx1"/>
+                </a:solidFill>
+                <a:latin typeface="+mn-lt"/>
+                <a:ea typeface="+mn-ea"/>
+                <a:cs typeface="+mn-cs"/>
+              </a:defRPr>
+            </a:lvl9pPr>
+          </a:lstStyle>
+          <a:p>
+            <a:pPr marL="0">
+              <a:spcBef>
+                <a:spcPts val="0"/>
+              </a:spcBef>
+            </a:pPr>
+            <a:r>
+              <a:rPr lang="en-US" i="1" dirty="0" smtClean="0"/>
+              <a:t>Partnering with: </a:t>
+            </a:r>
+          </a:p>
+          <a:p>
+            <a:pPr marL="0">
+              <a:spcBef>
+                <a:spcPts val="0"/>
+              </a:spcBef>
+            </a:pPr>
+            <a:r>
+              <a:rPr lang="en-US" dirty="0" smtClean="0"/>
+              <a:t>Children’s Science Center</a:t>
+            </a:r>
+            <a:endParaRPr lang="en-US" dirty="0"/>
+          </a:p>
+        </p:txBody>
+      </p:sp>
     </p:spTree>
     <p:extLst>
       <p:ext uri="{BB962C8B-B14F-4D97-AF65-F5344CB8AC3E}">
@@ -3875,28 +4186,106 @@
             <p:ph idx="1"/>
           </p:nvPr>
         </p:nvSpPr>
-        <p:spPr/>
+        <p:spPr>
+          <a:xfrm>
+            <a:off x="365760" y="1005840"/>
+            <a:ext cx="7325221" cy="5135033"/>
+          </a:xfrm>
+        </p:spPr>
         <p:txBody>
           <a:bodyPr/>
           <a:lstStyle/>
           <a:p>
+            <a:pPr marL="0" indent="0">
+              <a:buNone/>
+            </a:pPr>
+            <a:r>
+              <a:rPr lang="en-US" b="1" dirty="0" smtClean="0"/>
+              <a:t>What is a “beacon”?</a:t>
+            </a:r>
+          </a:p>
+          <a:p>
+            <a:pPr marL="0" indent="0">
+              <a:buNone/>
+            </a:pPr>
+            <a:r>
+              <a:rPr lang="en-US" dirty="0" smtClean="0"/>
+              <a:t>A small device that broadcasts a URL</a:t>
+            </a:r>
+          </a:p>
+          <a:p>
+            <a:pPr marL="0" indent="0">
+              <a:buNone/>
+            </a:pPr>
+            <a:endParaRPr lang="en-US" dirty="0"/>
+          </a:p>
+          <a:p>
+            <a:pPr marL="0" indent="0">
+              <a:buNone/>
+            </a:pPr>
+            <a:r>
+              <a:rPr lang="en-US" b="1" dirty="0" smtClean="0"/>
+              <a:t>Our Goal:</a:t>
+            </a:r>
+          </a:p>
+          <a:p>
+            <a:pPr marL="457200" indent="-457200">
+              <a:buAutoNum type="arabicPeriod"/>
+            </a:pPr>
+            <a:r>
+              <a:rPr lang="en-US" dirty="0" smtClean="0"/>
+              <a:t>Collect analytics surrounding a given location</a:t>
+            </a:r>
+          </a:p>
+          <a:p>
+            <a:pPr marL="457200" indent="-457200">
+              <a:buAutoNum type="arabicPeriod"/>
+            </a:pPr>
+            <a:r>
+              <a:rPr lang="en-US" dirty="0" smtClean="0"/>
+              <a:t>Provide users with meaningful, contextual information</a:t>
+            </a:r>
+          </a:p>
+          <a:p>
+            <a:pPr marL="0" indent="0">
+              <a:buNone/>
+            </a:pPr>
+            <a:endParaRPr lang="en-US" b="1" dirty="0" smtClean="0"/>
+          </a:p>
+          <a:p>
+            <a:pPr marL="0" indent="0">
+              <a:buNone/>
+            </a:pPr>
+            <a:r>
+              <a:rPr lang="en-US" b="1" dirty="0" smtClean="0"/>
+              <a:t>Ultimate Vision:</a:t>
+            </a:r>
+          </a:p>
+          <a:p>
+            <a:pPr marL="0" indent="0">
+              <a:buNone/>
+            </a:pPr>
+            <a:r>
+              <a:rPr lang="en-US" dirty="0" smtClean="0"/>
+              <a:t>A </a:t>
+            </a:r>
             <a:r>
               <a:rPr lang="en-US" i="1" dirty="0" smtClean="0"/>
-              <a:t>Brandon Hare</a:t>
-            </a:r>
-          </a:p>
-          <a:p>
+              <a:t>One Blackbaud </a:t>
+            </a:r>
+            <a:r>
+              <a:rPr lang="en-US" dirty="0" smtClean="0"/>
+              <a:t>service that integrates beacon technology into </a:t>
+            </a:r>
             <a:r>
               <a:rPr lang="en-US" i="1" dirty="0" smtClean="0"/>
-              <a:t>Chris Rodgers</a:t>
-            </a:r>
-          </a:p>
-          <a:p>
-            <a:r>
-              <a:rPr lang="en-US" i="1" dirty="0" smtClean="0"/>
-              <a:t>Steve Brush</a:t>
-            </a:r>
-            <a:endParaRPr lang="en-US" i="1" dirty="0"/>
+              <a:t>any</a:t>
+            </a:r>
+            <a:r>
+              <a:rPr lang="en-US" dirty="0" smtClean="0"/>
+              <a:t> Blackbaud CRM</a:t>
+            </a:r>
+            <a:endParaRPr lang="en-US" dirty="0"/>
           </a:p>
         </p:txBody>
       </p:sp>
@@ -3912,21 +4301,53 @@
         </p:nvSpPr>
         <p:spPr/>
         <p:txBody>
-          <a:bodyPr/>
+          <a:bodyPr>
+            <a:normAutofit/>
+          </a:bodyPr>
           <a:lstStyle/>
           <a:p>
             <a:r>
-              <a:rPr lang="en-US" dirty="0" smtClean="0"/>
-              <a:t>TEAM MEMBERS:</a:t>
-            </a:r>
-            <a:endParaRPr lang="en-US" dirty="0"/>
+              <a:rPr lang="en-US" sz="2800" dirty="0" smtClean="0"/>
+              <a:t>Introduction</a:t>
+            </a:r>
+            <a:endParaRPr lang="en-US" sz="2800" dirty="0"/>
           </a:p>
         </p:txBody>
       </p:sp>
+      <p:pic>
+        <p:nvPicPr>
+          <p:cNvPr id="4" name="Picture 3"/>
+          <p:cNvPicPr>
+            <a:picLocks noChangeAspect="1"/>
+          </p:cNvPicPr>
+          <p:nvPr/>
+        </p:nvPicPr>
+        <p:blipFill>
+          <a:blip r:embed="rId3">
+            <a:extLst>
+              <a:ext uri="{28A0092B-C50C-407E-A947-70E740481C1C}">
+                <a14:useLocalDpi xmlns:a14="http://schemas.microsoft.com/office/drawing/2010/main" val="0"/>
+              </a:ext>
+            </a:extLst>
+          </a:blip>
+          <a:stretch>
+            <a:fillRect/>
+          </a:stretch>
+        </p:blipFill>
+        <p:spPr>
+          <a:xfrm>
+            <a:off x="6150278" y="0"/>
+            <a:ext cx="2993721" cy="2993721"/>
+          </a:xfrm>
+          <a:prstGeom prst="rect">
+            <a:avLst/>
+          </a:prstGeom>
+        </p:spPr>
+      </p:pic>
     </p:spTree>
     <p:extLst>
       <p:ext uri="{BB962C8B-B14F-4D97-AF65-F5344CB8AC3E}">
-        <p14:creationId xmlns:p14="http://schemas.microsoft.com/office/powerpoint/2010/main" val="2052119055"/>
+        <p14:creationId xmlns:p14="http://schemas.microsoft.com/office/powerpoint/2010/main" val="1756376382"/>
       </p:ext>
     </p:extLst>
   </p:cSld>
@@ -3939,12 +4360,19 @@
         <p:fade/>
       </p:transition>
     </mc:Choice>
-    <mc:Fallback xmlns="" xmlns:mv="urn:schemas-microsoft-com:mac:vml">
+    <mc:Fallback xmlns:mv="urn:schemas-microsoft-com:mac:vml" xmlns="">
       <p:transition spd="med">
         <p:fade/>
       </p:transition>
     </mc:Fallback>
   </mc:AlternateContent>
+  <p:timing>
+    <p:tnLst>
+      <p:par>
+        <p:cTn id="1" dur="indefinite" restart="never" nodeType="tmRoot"/>
+      </p:par>
+    </p:tnLst>
+  </p:timing>
 </p:sld>
 </file>
 
@@ -4015,13 +4443,29 @@
           <a:p>
             <a:r>
               <a:rPr lang="en-US" dirty="0" smtClean="0"/>
-              <a:t>Provides clients the ability to track capacity and visits to an exhibit, as well as tailor a user’s experience based on their proximity to a location</a:t>
-            </a:r>
-          </a:p>
-          <a:p>
-            <a:r>
-              <a:rPr lang="en-US" dirty="0" smtClean="0"/>
-              <a:t>Delivers relevant information to constituents (users) for a given exhibit</a:t>
+              <a:t>Provides clients the ability to track capacity and visits to an exhibit, as well as tailor a user’s experience based on </a:t>
+            </a:r>
+            <a:r>
+              <a:rPr lang="en-US" dirty="0" smtClean="0"/>
+              <a:t>their proximity </a:t>
+            </a:r>
+            <a:r>
+              <a:rPr lang="en-US" dirty="0" smtClean="0"/>
+              <a:t>to a location</a:t>
+            </a:r>
+          </a:p>
+          <a:p>
+            <a:r>
+              <a:rPr lang="en-US" dirty="0" smtClean="0"/>
+              <a:t>Delivers relevant information to constituents </a:t>
+            </a:r>
+            <a:r>
+              <a:rPr lang="en-US" dirty="0" smtClean="0"/>
+              <a:t>for </a:t>
+            </a:r>
+            <a:r>
+              <a:rPr lang="en-US" dirty="0" smtClean="0"/>
+              <a:t>a given exhibit</a:t>
             </a:r>
           </a:p>
           <a:p>
@@ -4061,7 +4505,7 @@
     </p:spTree>
     <p:extLst>
       <p:ext uri="{BB962C8B-B14F-4D97-AF65-F5344CB8AC3E}">
-        <p14:creationId xmlns:p14="http://schemas.microsoft.com/office/powerpoint/2010/main" val="1756376382"/>
+        <p14:creationId xmlns:p14="http://schemas.microsoft.com/office/powerpoint/2010/main" val="1630001579"/>
       </p:ext>
     </p:extLst>
   </p:cSld>
@@ -4074,7 +4518,7 @@
         <p:fade/>
       </p:transition>
     </mc:Choice>
-    <mc:Fallback xmlns="" xmlns:mv="urn:schemas-microsoft-com:mac:vml">
+    <mc:Fallback xmlns:mv="urn:schemas-microsoft-com:mac:vml" xmlns="">
       <p:transition spd="med">
         <p:fade/>
       </p:transition>
@@ -4215,7 +4659,7 @@
         <p:fade/>
       </p:transition>
     </mc:Choice>
-    <mc:Fallback xmlns="" xmlns:mv="urn:schemas-microsoft-com:mac:vml">
+    <mc:Fallback xmlns:mv="urn:schemas-microsoft-com:mac:vml" xmlns="">
       <p:transition spd="med">
         <p:fade/>
       </p:transition>
@@ -4339,102 +4783,7 @@
         <p:fade/>
       </p:transition>
     </mc:Choice>
-    <mc:Fallback xmlns="" xmlns:mv="urn:schemas-microsoft-com:mac:vml">
-      <p:transition spd="med">
-        <p:fade/>
-      </p:transition>
-    </mc:Fallback>
-  </mc:AlternateContent>
-</p:sld>
-</file>
-
-<file path=ppt/slides/slide6.xml><?xml version="1.0" encoding="utf-8"?>
-<p:sld xmlns:a="http://schemas.openxmlformats.org/drawingml/2006/main" xmlns:r="http://schemas.openxmlformats.org/officeDocument/2006/relationships" xmlns:p="http://schemas.openxmlformats.org/presentationml/2006/main">
-  <p:cSld>
-    <p:spTree>
-      <p:nvGrpSpPr>
-        <p:cNvPr id="1" name=""/>
-        <p:cNvGrpSpPr/>
-        <p:nvPr/>
-      </p:nvGrpSpPr>
-      <p:grpSpPr>
-        <a:xfrm>
-          <a:off x="0" y="0"/>
-          <a:ext cx="0" cy="0"/>
-          <a:chOff x="0" y="0"/>
-          <a:chExt cx="0" cy="0"/>
-        </a:xfrm>
-      </p:grpSpPr>
-      <p:sp>
-        <p:nvSpPr>
-          <p:cNvPr id="2" name="Content Placeholder 1"/>
-          <p:cNvSpPr>
-            <a:spLocks noGrp="1"/>
-          </p:cNvSpPr>
-          <p:nvPr>
-            <p:ph idx="1"/>
-          </p:nvPr>
-        </p:nvSpPr>
-        <p:spPr>
-          <a:xfrm>
-            <a:off x="365760" y="1005840"/>
-            <a:ext cx="7350273" cy="5135033"/>
-          </a:xfrm>
-        </p:spPr>
-        <p:txBody>
-          <a:bodyPr/>
-          <a:lstStyle/>
-          <a:p>
-            <a:r>
-              <a:rPr lang="en-US" dirty="0" smtClean="0"/>
-              <a:t>Assign product manager to assist in integrating Sky Beacons as an official service under One Blackbaud</a:t>
-            </a:r>
-            <a:endParaRPr lang="en-US" dirty="0"/>
-          </a:p>
-        </p:txBody>
-      </p:sp>
-      <p:sp>
-        <p:nvSpPr>
-          <p:cNvPr id="3" name="Title 2"/>
-          <p:cNvSpPr>
-            <a:spLocks noGrp="1"/>
-          </p:cNvSpPr>
-          <p:nvPr>
-            <p:ph type="title"/>
-          </p:nvPr>
-        </p:nvSpPr>
-        <p:spPr/>
-        <p:txBody>
-          <a:bodyPr>
-            <a:normAutofit/>
-          </a:bodyPr>
-          <a:lstStyle/>
-          <a:p>
-            <a:r>
-              <a:rPr lang="en-US" sz="2800" dirty="0" smtClean="0"/>
-              <a:t>How Can RDO Leaders Help You continue?</a:t>
-            </a:r>
-            <a:endParaRPr lang="en-US" sz="2800" dirty="0"/>
-          </a:p>
-        </p:txBody>
-      </p:sp>
-    </p:spTree>
-    <p:extLst>
-      <p:ext uri="{BB962C8B-B14F-4D97-AF65-F5344CB8AC3E}">
-        <p14:creationId xmlns:p14="http://schemas.microsoft.com/office/powerpoint/2010/main" val="586382775"/>
-      </p:ext>
-    </p:extLst>
-  </p:cSld>
-  <p:clrMapOvr>
-    <a:masterClrMapping/>
-  </p:clrMapOvr>
-  <mc:AlternateContent xmlns:mc="http://schemas.openxmlformats.org/markup-compatibility/2006" xmlns:p14="http://schemas.microsoft.com/office/powerpoint/2010/main">
-    <mc:Choice Requires="p14">
-      <p:transition spd="med" p14:dur="700">
-        <p:fade/>
-      </p:transition>
-    </mc:Choice>
-    <mc:Fallback xmlns="" xmlns:mv="urn:schemas-microsoft-com:mac:vml">
+    <mc:Fallback xmlns:mv="urn:schemas-microsoft-com:mac:vml" xmlns="">
       <p:transition spd="med">
         <p:fade/>
       </p:transition>

</xml_diff>

<commit_message>
PPT and Script update
</commit_message>
<xml_diff>
--- a/presentation/presentation.pptx
+++ b/presentation/presentation.pptx
@@ -13,8 +13,8 @@
   <p:sldIdLst>
     <p:sldId id="347" r:id="rId5"/>
     <p:sldId id="349" r:id="rId6"/>
-    <p:sldId id="352" r:id="rId7"/>
-    <p:sldId id="350" r:id="rId8"/>
+    <p:sldId id="350" r:id="rId7"/>
+    <p:sldId id="352" r:id="rId8"/>
     <p:sldId id="351" r:id="rId9"/>
   </p:sldIdLst>
   <p:sldSz cx="9144000" cy="6858000" type="screen4x3"/>
@@ -374,7 +374,7 @@
               <a:pPr>
                 <a:defRPr/>
               </a:pPr>
-              <a:t>7/27/16</a:t>
+              <a:t>07/27/2016</a:t>
             </a:fld>
             <a:endParaRPr lang="en-US" dirty="0"/>
           </a:p>
@@ -590,7 +590,7 @@
               <a:pPr>
                 <a:defRPr/>
               </a:pPr>
-              <a:t>7/27/16</a:t>
+              <a:t>07/27/2016</a:t>
             </a:fld>
             <a:endParaRPr lang="en-US" dirty="0"/>
           </a:p>
@@ -1147,7 +1147,11 @@
           <a:p>
             <a:r>
               <a:rPr lang="en-US" i="1" dirty="0" smtClean="0"/>
-              <a:t>Explain your project.</a:t>
+              <a:t>Describe</a:t>
+            </a:r>
+            <a:r>
+              <a:rPr lang="en-US" i="1" baseline="0" dirty="0" smtClean="0"/>
+              <a:t> who benefits from this project and how?  How do our customers benefit?</a:t>
             </a:r>
             <a:endParaRPr lang="en-US" i="1" dirty="0"/>
           </a:p>
@@ -1185,7 +1189,7 @@
     </p:spTree>
     <p:extLst>
       <p:ext uri="{BB962C8B-B14F-4D97-AF65-F5344CB8AC3E}">
-        <p14:creationId xmlns:p14="http://schemas.microsoft.com/office/powerpoint/2010/main" val="2135137121"/>
+        <p14:creationId xmlns:p14="http://schemas.microsoft.com/office/powerpoint/2010/main" val="3781070066"/>
       </p:ext>
     </p:extLst>
   </p:cSld>
@@ -1241,11 +1245,7 @@
           <a:p>
             <a:r>
               <a:rPr lang="en-US" i="1" dirty="0" smtClean="0"/>
-              <a:t>Describe</a:t>
-            </a:r>
-            <a:r>
-              <a:rPr lang="en-US" i="1" baseline="0" dirty="0" smtClean="0"/>
-              <a:t> who benefits from this project and how?  How do our customers benefit?</a:t>
+              <a:t>Explain your project.</a:t>
             </a:r>
             <a:endParaRPr lang="en-US" i="1" dirty="0"/>
           </a:p>
@@ -1283,7 +1283,7 @@
     </p:spTree>
     <p:extLst>
       <p:ext uri="{BB962C8B-B14F-4D97-AF65-F5344CB8AC3E}">
-        <p14:creationId xmlns:p14="http://schemas.microsoft.com/office/powerpoint/2010/main" val="3781070066"/>
+        <p14:creationId xmlns:p14="http://schemas.microsoft.com/office/powerpoint/2010/main" val="2135137121"/>
       </p:ext>
     </p:extLst>
   </p:cSld>
@@ -1549,7 +1549,7 @@
         <p:fade/>
       </p:transition>
     </mc:Choice>
-    <mc:Fallback xmlns:mv="urn:schemas-microsoft-com:mac:vml" xmlns="">
+    <mc:Fallback xmlns="" xmlns:mv="urn:schemas-microsoft-com:mac:vml">
       <p:transition spd="med">
         <p:fade/>
       </p:transition>
@@ -1733,7 +1733,7 @@
         <p:fade/>
       </p:transition>
     </mc:Choice>
-    <mc:Fallback xmlns:mv="urn:schemas-microsoft-com:mac:vml" xmlns="">
+    <mc:Fallback xmlns="" xmlns:mv="urn:schemas-microsoft-com:mac:vml">
       <p:transition spd="med">
         <p:fade/>
       </p:transition>
@@ -1990,7 +1990,7 @@
         <p:fade/>
       </p:transition>
     </mc:Choice>
-    <mc:Fallback xmlns:mv="urn:schemas-microsoft-com:mac:vml" xmlns="">
+    <mc:Fallback xmlns="" xmlns:mv="urn:schemas-microsoft-com:mac:vml">
       <p:transition spd="med">
         <p:fade/>
       </p:transition>
@@ -3144,7 +3144,7 @@
         <p:fade/>
       </p:transition>
     </mc:Choice>
-    <mc:Fallback xmlns:mv="urn:schemas-microsoft-com:mac:vml" xmlns="">
+    <mc:Fallback xmlns="" xmlns:mv="urn:schemas-microsoft-com:mac:vml">
       <p:transition spd="med">
         <p:fade/>
       </p:transition>
@@ -4360,7 +4360,7 @@
         <p:fade/>
       </p:transition>
     </mc:Choice>
-    <mc:Fallback xmlns:mv="urn:schemas-microsoft-com:mac:vml" xmlns="">
+    <mc:Fallback xmlns="" xmlns:mv="urn:schemas-microsoft-com:mac:vml">
       <p:transition spd="med">
         <p:fade/>
       </p:transition>
@@ -4403,77 +4403,69 @@
             <p:ph idx="1"/>
           </p:nvPr>
         </p:nvSpPr>
-        <p:spPr>
-          <a:xfrm>
-            <a:off x="365760" y="1005840"/>
-            <a:ext cx="7325221" cy="5135033"/>
-          </a:xfrm>
-        </p:spPr>
+        <p:spPr/>
         <p:txBody>
           <a:bodyPr/>
           <a:lstStyle/>
           <a:p>
             <a:r>
               <a:rPr lang="en-US" dirty="0" smtClean="0"/>
-              <a:t>Service that allows Blackbaud clients to integrate Beacon Technology into their CRM (most notably, </a:t>
-            </a:r>
-            <a:r>
-              <a:rPr lang="en-US" dirty="0" err="1" smtClean="0"/>
-              <a:t>Altru</a:t>
-            </a:r>
+              <a:t>Clients and their constituents</a:t>
+            </a:r>
+          </a:p>
+          <a:p>
             <a:r>
               <a:rPr lang="en-US" dirty="0" smtClean="0"/>
-              <a:t>).</a:t>
+              <a:t>Clients:</a:t>
             </a:r>
           </a:p>
           <a:p>
             <a:pPr lvl="1"/>
             <a:r>
+              <a:rPr lang="en-US" dirty="0" smtClean="0">
+                <a:sym typeface="Wingdings"/>
+              </a:rPr>
+              <a:t>Analytics for exhibit capacity, visits, length of stay</a:t>
+            </a:r>
+          </a:p>
+          <a:p>
+            <a:pPr lvl="1"/>
+            <a:r>
               <a:rPr lang="en-US" dirty="0" smtClean="0"/>
-              <a:t>Beacons are small devices that transmit a URL of the owner’s choosing</a:t>
+              <a:t>Enhance </a:t>
+            </a:r>
+            <a:r>
+              <a:rPr lang="en-US" dirty="0"/>
+              <a:t>experience while users are </a:t>
+            </a:r>
+            <a:r>
+              <a:rPr lang="en-US" dirty="0" smtClean="0"/>
+              <a:t>there</a:t>
             </a:r>
           </a:p>
           <a:p>
             <a:pPr lvl="1"/>
+            <a:endParaRPr lang="en-US" dirty="0"/>
+          </a:p>
+          <a:p>
             <a:r>
               <a:rPr lang="en-US" dirty="0" smtClean="0"/>
-              <a:t>Users can then receive the URL on their phones</a:t>
-            </a:r>
-          </a:p>
-          <a:p>
+              <a:t>Constituents:</a:t>
+            </a:r>
+          </a:p>
+          <a:p>
+            <a:pPr lvl="1"/>
             <a:r>
               <a:rPr lang="en-US" dirty="0" smtClean="0"/>
-              <a:t>Provides clients the ability to track capacity and visits to an exhibit, as well as tailor a user’s experience based on </a:t>
-            </a:r>
+              <a:t>Receive tailored experience</a:t>
+            </a:r>
+          </a:p>
+          <a:p>
+            <a:pPr lvl="1"/>
             <a:r>
               <a:rPr lang="en-US" dirty="0" smtClean="0"/>
-              <a:t>their proximity </a:t>
-            </a:r>
-            <a:r>
-              <a:rPr lang="en-US" dirty="0" smtClean="0"/>
-              <a:t>to a location</a:t>
-            </a:r>
-          </a:p>
-          <a:p>
-            <a:r>
-              <a:rPr lang="en-US" dirty="0" smtClean="0"/>
-              <a:t>Delivers relevant information to constituents </a:t>
-            </a:r>
-            <a:r>
-              <a:rPr lang="en-US" dirty="0" smtClean="0"/>
-              <a:t>for </a:t>
-            </a:r>
-            <a:r>
-              <a:rPr lang="en-US" dirty="0" smtClean="0"/>
-              <a:t>a given exhibit</a:t>
-            </a:r>
-          </a:p>
-          <a:p>
-            <a:r>
-              <a:rPr lang="en-US" dirty="0" smtClean="0"/>
-              <a:t>Informs visitors of nearby docents or staff to get help or directions</a:t>
-            </a:r>
-            <a:endParaRPr lang="en-US" dirty="0"/>
+              <a:t>Contextual information surrounding an entity (exhibit, docent, etc.)</a:t>
+            </a:r>
           </a:p>
         </p:txBody>
       </p:sp>
@@ -4489,23 +4481,21 @@
         </p:nvSpPr>
         <p:spPr/>
         <p:txBody>
-          <a:bodyPr>
-            <a:normAutofit/>
-          </a:bodyPr>
+          <a:bodyPr/>
           <a:lstStyle/>
           <a:p>
             <a:r>
-              <a:rPr lang="en-US" sz="2800" dirty="0" smtClean="0"/>
-              <a:t>what did you create &amp; what does it do?</a:t>
-            </a:r>
-            <a:endParaRPr lang="en-US" sz="2800" dirty="0"/>
+              <a:rPr lang="en-US" dirty="0" smtClean="0"/>
+              <a:t>Who Benefits from this &amp; How?</a:t>
+            </a:r>
+            <a:endParaRPr lang="en-US" dirty="0"/>
           </a:p>
         </p:txBody>
       </p:sp>
     </p:spTree>
     <p:extLst>
       <p:ext uri="{BB962C8B-B14F-4D97-AF65-F5344CB8AC3E}">
-        <p14:creationId xmlns:p14="http://schemas.microsoft.com/office/powerpoint/2010/main" val="1630001579"/>
+        <p14:creationId xmlns:p14="http://schemas.microsoft.com/office/powerpoint/2010/main" val="1065922124"/>
       </p:ext>
     </p:extLst>
   </p:cSld>
@@ -4518,7 +4508,7 @@
         <p:fade/>
       </p:transition>
     </mc:Choice>
-    <mc:Fallback xmlns:mv="urn:schemas-microsoft-com:mac:vml" xmlns="">
+    <mc:Fallback xmlns="" xmlns:mv="urn:schemas-microsoft-com:mac:vml">
       <p:transition spd="med">
         <p:fade/>
       </p:transition>
@@ -4554,69 +4544,61 @@
             <p:ph idx="1"/>
           </p:nvPr>
         </p:nvSpPr>
-        <p:spPr/>
+        <p:spPr>
+          <a:xfrm>
+            <a:off x="365760" y="1005840"/>
+            <a:ext cx="7325221" cy="5135033"/>
+          </a:xfrm>
+        </p:spPr>
         <p:txBody>
           <a:bodyPr/>
           <a:lstStyle/>
           <a:p>
             <a:r>
               <a:rPr lang="en-US" dirty="0" smtClean="0"/>
-              <a:t>Clients and their constituents</a:t>
-            </a:r>
-          </a:p>
-          <a:p>
+              <a:t>Service that allows Blackbaud clients to integrate Beacon Technology into their CRM (most notably, </a:t>
+            </a:r>
+            <a:r>
+              <a:rPr lang="en-US" dirty="0" err="1" smtClean="0"/>
+              <a:t>Altru</a:t>
+            </a:r>
             <a:r>
               <a:rPr lang="en-US" dirty="0" smtClean="0"/>
-              <a:t>Clients:</a:t>
+              <a:t>).</a:t>
             </a:r>
           </a:p>
           <a:p>
             <a:pPr lvl="1"/>
             <a:r>
-              <a:rPr lang="en-US" dirty="0" smtClean="0">
-                <a:sym typeface="Wingdings"/>
-              </a:rPr>
-              <a:t>Analytics for exhibit capacity, visits, length of stay</a:t>
+              <a:rPr lang="en-US" dirty="0" smtClean="0"/>
+              <a:t>Beacons are small devices that transmit a URL of the owner’s choosing</a:t>
             </a:r>
           </a:p>
           <a:p>
             <a:pPr lvl="1"/>
             <a:r>
               <a:rPr lang="en-US" dirty="0" smtClean="0"/>
-              <a:t>Enhance </a:t>
-            </a:r>
-            <a:r>
-              <a:rPr lang="en-US" dirty="0"/>
-              <a:t>experience while users are </a:t>
-            </a:r>
+              <a:t>Users can then receive the URL on their phones</a:t>
+            </a:r>
+          </a:p>
+          <a:p>
             <a:r>
               <a:rPr lang="en-US" dirty="0" smtClean="0"/>
-              <a:t>there</a:t>
-            </a:r>
-          </a:p>
-          <a:p>
-            <a:pPr lvl="1"/>
+              <a:t>Provides clients the ability to track capacity and visits to an exhibit, as well as tailor a user’s experience based on their proximity to a location</a:t>
+            </a:r>
+          </a:p>
+          <a:p>
+            <a:r>
+              <a:rPr lang="en-US" dirty="0" smtClean="0"/>
+              <a:t>Delivers relevant information to constituents for a given exhibit</a:t>
+            </a:r>
+          </a:p>
+          <a:p>
+            <a:r>
+              <a:rPr lang="en-US" dirty="0" smtClean="0"/>
+              <a:t>Informs visitors of nearby docents or staff to get help or directions</a:t>
+            </a:r>
             <a:endParaRPr lang="en-US" dirty="0"/>
-          </a:p>
-          <a:p>
-            <a:r>
-              <a:rPr lang="en-US" dirty="0" smtClean="0"/>
-              <a:t>Constituents:</a:t>
-            </a:r>
-          </a:p>
-          <a:p>
-            <a:pPr lvl="1"/>
-            <a:r>
-              <a:rPr lang="en-US" dirty="0" smtClean="0"/>
-              <a:t>Receive tailored experience</a:t>
-            </a:r>
-          </a:p>
-          <a:p>
-            <a:pPr lvl="1"/>
-            <a:r>
-              <a:rPr lang="en-US" dirty="0" smtClean="0"/>
-              <a:t>Contextual information surrounding an entity (exhibit, docent, etc.)</a:t>
-            </a:r>
           </a:p>
         </p:txBody>
       </p:sp>
@@ -4632,21 +4614,23 @@
         </p:nvSpPr>
         <p:spPr/>
         <p:txBody>
-          <a:bodyPr/>
+          <a:bodyPr>
+            <a:normAutofit/>
+          </a:bodyPr>
           <a:lstStyle/>
           <a:p>
             <a:r>
-              <a:rPr lang="en-US" dirty="0" smtClean="0"/>
-              <a:t>Who Benefits from this &amp; How?</a:t>
-            </a:r>
-            <a:endParaRPr lang="en-US" dirty="0"/>
+              <a:rPr lang="en-US" sz="2800" dirty="0" smtClean="0"/>
+              <a:t>what did you create &amp; what does it do?</a:t>
+            </a:r>
+            <a:endParaRPr lang="en-US" sz="2800" dirty="0"/>
           </a:p>
         </p:txBody>
       </p:sp>
     </p:spTree>
     <p:extLst>
       <p:ext uri="{BB962C8B-B14F-4D97-AF65-F5344CB8AC3E}">
-        <p14:creationId xmlns:p14="http://schemas.microsoft.com/office/powerpoint/2010/main" val="1065922124"/>
+        <p14:creationId xmlns:p14="http://schemas.microsoft.com/office/powerpoint/2010/main" val="1630001579"/>
       </p:ext>
     </p:extLst>
   </p:cSld>
@@ -4659,7 +4643,7 @@
         <p:fade/>
       </p:transition>
     </mc:Choice>
-    <mc:Fallback xmlns:mv="urn:schemas-microsoft-com:mac:vml" xmlns="">
+    <mc:Fallback xmlns="" xmlns:mv="urn:schemas-microsoft-com:mac:vml">
       <p:transition spd="med">
         <p:fade/>
       </p:transition>
@@ -4725,22 +4709,13 @@
           <a:p>
             <a:r>
               <a:rPr lang="en-US" dirty="0" smtClean="0"/>
-              <a:t>CRM integration for easy analytics consumption</a:t>
-            </a:r>
-          </a:p>
-          <a:p>
+              <a:t>CRM integration for easy analytics </a:t>
+            </a:r>
             <a:r>
               <a:rPr lang="en-US" dirty="0" smtClean="0"/>
-              <a:t>Support </a:t>
-            </a:r>
-            <a:r>
-              <a:rPr lang="en-US" dirty="0" err="1" smtClean="0"/>
-              <a:t>Eddystone</a:t>
-            </a:r>
-            <a:r>
-              <a:rPr lang="en-US" dirty="0" smtClean="0"/>
-              <a:t> and iBeacon formats to make it platform agnostic</a:t>
-            </a:r>
+              <a:t>consumption</a:t>
+            </a:r>
+            <a:endParaRPr lang="en-US" dirty="0" smtClean="0"/>
           </a:p>
         </p:txBody>
       </p:sp>
@@ -4783,7 +4758,7 @@
         <p:fade/>
       </p:transition>
     </mc:Choice>
-    <mc:Fallback xmlns:mv="urn:schemas-microsoft-com:mac:vml" xmlns="">
+    <mc:Fallback xmlns="" xmlns:mv="urn:schemas-microsoft-com:mac:vml">
       <p:transition spd="med">
         <p:fade/>
       </p:transition>
@@ -5747,12 +5722,9 @@
 </file>
 
 <file path=customXml/item1.xml><?xml version="1.0" encoding="utf-8"?>
-<?mso-contentType ?>
-<FormTemplates xmlns="http://schemas.microsoft.com/sharepoint/v3/contenttype/forms">
-  <Display>DocumentLibraryForm</Display>
-  <Edit>DocumentLibraryForm</Edit>
-  <New>DocumentLibraryForm</New>
-</FormTemplates>
+<p:properties xmlns:p="http://schemas.microsoft.com/office/2006/metadata/properties" xmlns:xsi="http://www.w3.org/2001/XMLSchema-instance">
+  <documentManagement/>
+</p:properties>
 </file>
 
 <file path=customXml/item2.xml><?xml version="1.0" encoding="utf-8"?>
@@ -5870,15 +5842,25 @@
 </file>
 
 <file path=customXml/item3.xml><?xml version="1.0" encoding="utf-8"?>
-<p:properties xmlns:p="http://schemas.microsoft.com/office/2006/metadata/properties" xmlns:xsi="http://www.w3.org/2001/XMLSchema-instance">
-  <documentManagement/>
-</p:properties>
+<?mso-contentType ?>
+<FormTemplates xmlns="http://schemas.microsoft.com/sharepoint/v3/contenttype/forms">
+  <Display>DocumentLibraryForm</Display>
+  <Edit>DocumentLibraryForm</Edit>
+  <New>DocumentLibraryForm</New>
+</FormTemplates>
 </file>
 
 <file path=customXml/itemProps1.xml><?xml version="1.0" encoding="utf-8"?>
-<ds:datastoreItem xmlns:ds="http://schemas.openxmlformats.org/officeDocument/2006/customXml" ds:itemID="{42D12E66-9D26-40FF-BE5F-EF66873B8462}">
+<ds:datastoreItem xmlns:ds="http://schemas.openxmlformats.org/officeDocument/2006/customXml" ds:itemID="{6539E1ED-E8DD-420F-BA68-289147B034CF}">
   <ds:schemaRefs>
-    <ds:schemaRef ds:uri="http://schemas.microsoft.com/sharepoint/v3/contenttype/forms"/>
+    <ds:schemaRef ds:uri="http://purl.org/dc/terms/"/>
+    <ds:schemaRef ds:uri="http://schemas.microsoft.com/office/2006/documentManagement/types"/>
+    <ds:schemaRef ds:uri="http://schemas.openxmlformats.org/package/2006/metadata/core-properties"/>
+    <ds:schemaRef ds:uri="http://purl.org/dc/elements/1.1/"/>
+    <ds:schemaRef ds:uri="http://schemas.microsoft.com/office/2006/metadata/properties"/>
+    <ds:schemaRef ds:uri="http://purl.org/dc/dcmitype/"/>
+    <ds:schemaRef ds:uri="http://schemas.microsoft.com/office/infopath/2007/PartnerControls"/>
+    <ds:schemaRef ds:uri="http://www.w3.org/XML/1998/namespace"/>
   </ds:schemaRefs>
 </ds:datastoreItem>
 </file>
@@ -5900,16 +5882,9 @@
 </file>
 
 <file path=customXml/itemProps3.xml><?xml version="1.0" encoding="utf-8"?>
-<ds:datastoreItem xmlns:ds="http://schemas.openxmlformats.org/officeDocument/2006/customXml" ds:itemID="{6539E1ED-E8DD-420F-BA68-289147B034CF}">
+<ds:datastoreItem xmlns:ds="http://schemas.openxmlformats.org/officeDocument/2006/customXml" ds:itemID="{42D12E66-9D26-40FF-BE5F-EF66873B8462}">
   <ds:schemaRefs>
-    <ds:schemaRef ds:uri="http://purl.org/dc/terms/"/>
-    <ds:schemaRef ds:uri="http://schemas.microsoft.com/office/2006/documentManagement/types"/>
-    <ds:schemaRef ds:uri="http://schemas.openxmlformats.org/package/2006/metadata/core-properties"/>
-    <ds:schemaRef ds:uri="http://purl.org/dc/elements/1.1/"/>
-    <ds:schemaRef ds:uri="http://schemas.microsoft.com/office/2006/metadata/properties"/>
-    <ds:schemaRef ds:uri="http://purl.org/dc/dcmitype/"/>
-    <ds:schemaRef ds:uri="http://schemas.microsoft.com/office/infopath/2007/PartnerControls"/>
-    <ds:schemaRef ds:uri="http://www.w3.org/XML/1998/namespace"/>
+    <ds:schemaRef ds:uri="http://schemas.microsoft.com/sharepoint/v3/contenttype/forms"/>
   </ds:schemaRefs>
 </ds:datastoreItem>
 </file>
</xml_diff>